<commit_message>
More on first lecture
</commit_message>
<xml_diff>
--- a/lectures/intro/diagrams.pptx
+++ b/lectures/intro/diagrams.pptx
@@ -3673,7 +3673,7 @@
         <p:spPr>
           <a:xfrm>
             <a:off x="1288487" y="2631314"/>
-            <a:ext cx="6635150" cy="461665"/>
+            <a:ext cx="7007046" cy="461665"/>
           </a:xfrm>
           <a:prstGeom prst="rect">
             <a:avLst/>
@@ -3688,7 +3688,15 @@
           <a:p>
             <a:r>
               <a:rPr lang="en-US" sz="2400" dirty="0" smtClean="0"/>
-              <a:t>http://courses.washington.edu:80/info343/stearns/</a:t>
+              <a:t>http://courses.washington.edu</a:t>
+            </a:r>
+            <a:r>
+              <a:rPr lang="en-US" sz="2400" dirty="0" smtClean="0"/>
+              <a:t>:8080</a:t>
+            </a:r>
+            <a:r>
+              <a:rPr lang="en-US" sz="2400" dirty="0" smtClean="0"/>
+              <a:t>/info343/stearns/</a:t>
             </a:r>
             <a:endParaRPr lang="en-US" sz="2400" dirty="0"/>
           </a:p>
@@ -3838,7 +3846,7 @@
         </p:nvSpPr>
         <p:spPr>
           <a:xfrm rot="5400000">
-            <a:off x="6569494" y="2180232"/>
+            <a:off x="6940824" y="2180232"/>
             <a:ext cx="170814" cy="2131306"/>
           </a:xfrm>
           <a:prstGeom prst="rightBrace">
@@ -3876,7 +3884,7 @@
         </p:nvSpPr>
         <p:spPr>
           <a:xfrm>
-            <a:off x="6348360" y="3353431"/>
+            <a:off x="6720657" y="3353431"/>
             <a:ext cx="613081" cy="369332"/>
           </a:xfrm>
           <a:prstGeom prst="rect">
@@ -3906,8 +3914,8 @@
         </p:nvSpPr>
         <p:spPr>
           <a:xfrm rot="5400000">
-            <a:off x="5311065" y="3098286"/>
-            <a:ext cx="170814" cy="298962"/>
+            <a:off x="5507833" y="2971971"/>
+            <a:ext cx="191071" cy="571848"/>
           </a:xfrm>
           <a:prstGeom prst="rightBrace">
             <a:avLst/>
@@ -3944,7 +3952,7 @@
         </p:nvSpPr>
         <p:spPr>
           <a:xfrm>
-            <a:off x="5083789" y="3353431"/>
+            <a:off x="5317444" y="3353431"/>
             <a:ext cx="583438" cy="369332"/>
           </a:xfrm>
           <a:prstGeom prst="rect">

</xml_diff>